<commit_message>
feat: clear project, add simple_path_tracer/ from arc/
</commit_message>
<xml_diff>
--- a/doc/Wonder v3.0种子轮融资.pptx
+++ b/doc/Wonder v3.0种子轮融资.pptx
@@ -5822,7 +5822,7 @@
               <a:rPr lang="zh-CN" altLang="en-US" dirty="0"/>
               <a:t>个免费用户真正用起来（在低代码平台上使用引擎或者编辑器）</a:t>
             </a:r>
-            <a:endParaRPr lang="en" dirty="0"/>
+            <a:endParaRPr lang="en-US" altLang="zh-CN" dirty="0"/>
           </a:p>
           <a:p>
             <a:pPr marL="285750" indent="-285750">
@@ -5830,7 +5830,7 @@
               <a:buChar char="•"/>
             </a:pPr>
             <a:r>
-              <a:rPr lang="en" dirty="0" err="1"/>
+              <a:rPr lang="en"/>
               <a:t>天使轮融资</a:t>
             </a:r>
             <a:r>
@@ -5852,6 +5852,25 @@
             <a:r>
               <a:rPr lang="zh-CN" altLang="en-US" dirty="0"/>
               <a:t>万</a:t>
+            </a:r>
+            <a:endParaRPr lang="en-US" altLang="zh-CN" dirty="0"/>
+          </a:p>
+          <a:p>
+            <a:pPr marL="285750" indent="-285750">
+              <a:buFont typeface="Arial" panose="020B0604020202020204" pitchFamily="34" charset="0"/>
+              <a:buChar char="•"/>
+            </a:pPr>
+            <a:r>
+              <a:rPr lang="zh-CN" altLang="en-US" dirty="0"/>
+              <a:t>初步收费：低代码平台的付费用户按月收费，获得</a:t>
+            </a:r>
+            <a:r>
+              <a:rPr lang="en-US" altLang="zh-CN" dirty="0"/>
+              <a:t>10</a:t>
+            </a:r>
+            <a:r>
+              <a:rPr lang="zh-CN" altLang="en-US" dirty="0"/>
+              <a:t>个付费用户</a:t>
             </a:r>
             <a:endParaRPr lang="en-US" altLang="zh-CN" dirty="0"/>
           </a:p>
@@ -5988,6 +6007,55 @@
                                           <p:spTgt spid="2">
                                             <p:txEl>
                                               <p:pRg st="1" end="1"/>
+                                            </p:txEl>
+                                          </p:spTgt>
+                                        </p:tgtEl>
+                                        <p:attrNameLst>
+                                          <p:attrName>style.visibility</p:attrName>
+                                        </p:attrNameLst>
+                                      </p:cBhvr>
+                                      <p:to>
+                                        <p:strVal val="visible"/>
+                                      </p:to>
+                                    </p:set>
+                                  </p:childTnLst>
+                                </p:cTn>
+                              </p:par>
+                            </p:childTnLst>
+                          </p:cTn>
+                        </p:par>
+                      </p:childTnLst>
+                    </p:cTn>
+                  </p:par>
+                  <p:par>
+                    <p:cTn id="11" fill="hold">
+                      <p:stCondLst>
+                        <p:cond delay="indefinite"/>
+                      </p:stCondLst>
+                      <p:childTnLst>
+                        <p:par>
+                          <p:cTn id="12" fill="hold">
+                            <p:stCondLst>
+                              <p:cond delay="0"/>
+                            </p:stCondLst>
+                            <p:childTnLst>
+                              <p:par>
+                                <p:cTn id="13" presetID="1" presetClass="entr" presetSubtype="0" fill="hold" grpId="0" nodeType="clickEffect">
+                                  <p:stCondLst>
+                                    <p:cond delay="0"/>
+                                  </p:stCondLst>
+                                  <p:childTnLst>
+                                    <p:set>
+                                      <p:cBhvr>
+                                        <p:cTn id="14" dur="1" fill="hold">
+                                          <p:stCondLst>
+                                            <p:cond delay="0"/>
+                                          </p:stCondLst>
+                                        </p:cTn>
+                                        <p:tgtEl>
+                                          <p:spTgt spid="2">
+                                            <p:txEl>
+                                              <p:pRg st="2" end="2"/>
                                             </p:txEl>
                                           </p:spTgt>
                                         </p:tgtEl>

</xml_diff>